<commit_message>
gjort ferdig foilene frem til sammenhenger foilen.
</commit_message>
<xml_diff>
--- a/MSB105 assign 2 presentasjon.pptx
+++ b/MSB105 assign 2 presentasjon.pptx
@@ -21,14 +21,6 @@
     <p:sldId id="269" r:id="rId15"/>
     <p:sldId id="270" r:id="rId16"/>
     <p:sldId id="271" r:id="rId17"/>
-    <p:sldId id="272" r:id="rId18"/>
-    <p:sldId id="273" r:id="rId19"/>
-    <p:sldId id="274" r:id="rId20"/>
-    <p:sldId id="275" r:id="rId21"/>
-    <p:sldId id="276" r:id="rId22"/>
-    <p:sldId id="277" r:id="rId23"/>
-    <p:sldId id="278" r:id="rId24"/>
-    <p:sldId id="279" r:id="rId25"/>
   </p:sldIdLst>
   <p:sldSz cx="9144000" cy="5143500" type="screen16x9"/>
   <p:notesSz cx="6858000" cy="9144000"/>
@@ -3195,7 +3187,7 @@
             </a:pPr>
             <a:r>
               <a:rPr/>
-              <a:t>Friday 17 Oct, 2025</a:t>
+              <a:t>Monday 20 Oct, 2025</a:t>
             </a:r>
           </a:p>
         </p:txBody>
@@ -3222,34 +3214,9 @@
           <a:chExt cx="0" cy="0"/>
         </a:xfrm>
       </p:grpSpPr>
-      <p:sp>
-        <p:nvSpPr>
-          <p:cNvPr id="2" name="Title 1"/>
-          <p:cNvSpPr>
-            <a:spLocks noGrp="1"/>
-          </p:cNvSpPr>
-          <p:nvPr>
-            <p:ph type="title"/>
-          </p:nvPr>
-        </p:nvSpPr>
-        <p:spPr/>
-        <p:txBody>
-          <a:bodyPr/>
-          <a:lstStyle/>
-          <a:p>
-            <a:pPr lvl="0" indent="0" marL="0">
-              <a:buNone/>
-            </a:pPr>
-            <a:r>
-              <a:rPr/>
-              <a:t>6 Kjønnsforskjeller</a:t>
-            </a:r>
-          </a:p>
-        </p:txBody>
-      </p:sp>
       <p:pic>
         <p:nvPicPr>
-          <p:cNvPr descr="MSB105-assign-2-presentasjon_files/figure-pptx/unnamed-chunk-5-1.png" id="0" name="Picture 1"/>
+          <p:cNvPr descr="MSB105-assign-2-presentasjon_files/figure-pptx/Fordeling%20av%20AFQT-1.png" id="0" name="Picture 1"/>
           <p:cNvPicPr>
             <a:picLocks noGrp="1" noChangeAspect="1"/>
           </p:cNvPicPr>
@@ -3299,9 +3266,34 @@
           <a:chExt cx="0" cy="0"/>
         </a:xfrm>
       </p:grpSpPr>
+      <p:sp>
+        <p:nvSpPr>
+          <p:cNvPr id="2" name="Title 1"/>
+          <p:cNvSpPr>
+            <a:spLocks noGrp="1"/>
+          </p:cNvSpPr>
+          <p:nvPr>
+            <p:ph type="title"/>
+          </p:nvPr>
+        </p:nvSpPr>
+        <p:spPr/>
+        <p:txBody>
+          <a:bodyPr/>
+          <a:lstStyle/>
+          <a:p>
+            <a:pPr lvl="0" indent="0" marL="0">
+              <a:buNone/>
+            </a:pPr>
+            <a:r>
+              <a:rPr/>
+              <a:t>7 Sammenhenger</a:t>
+            </a:r>
+          </a:p>
+        </p:txBody>
+      </p:sp>
       <p:pic>
         <p:nvPicPr>
-          <p:cNvPr descr="MSB105-assign-2-presentasjon_files/figure-pptx/unnamed-chunk-5-2.png" id="0" name="Picture 1"/>
+          <p:cNvPr descr="MSB105-assign-2-presentasjon_files/figure-pptx/unnamed-chunk-5-1.png" id="0" name="Picture 1"/>
           <p:cNvPicPr>
             <a:picLocks noGrp="1" noChangeAspect="1"/>
           </p:cNvPicPr>
@@ -3335,558 +3327,6 @@
 </file>
 
 <file path=ppt/slides/slide12.xml><?xml version="1.0" encoding="utf-8"?>
-<p:sld xmlns:a="http://schemas.openxmlformats.org/drawingml/2006/main" xmlns:r="http://schemas.openxmlformats.org/officeDocument/2006/relationships" xmlns:p="http://schemas.openxmlformats.org/presentationml/2006/main">
-  <p:cSld>
-    <p:spTree>
-      <p:nvGrpSpPr>
-        <p:cNvPr id="1" name=""/>
-        <p:cNvGrpSpPr/>
-        <p:nvPr/>
-      </p:nvGrpSpPr>
-      <p:grpSpPr>
-        <a:xfrm>
-          <a:off x="0" y="0"/>
-          <a:ext cx="0" cy="0"/>
-          <a:chOff x="0" y="0"/>
-          <a:chExt cx="0" cy="0"/>
-        </a:xfrm>
-      </p:grpSpPr>
-      <p:pic>
-        <p:nvPicPr>
-          <p:cNvPr descr="MSB105-assign-2-presentasjon_files/figure-pptx/unnamed-chunk-5-3.png" id="0" name="Picture 1"/>
-          <p:cNvPicPr>
-            <a:picLocks noGrp="1" noChangeAspect="1"/>
-          </p:cNvPicPr>
-          <p:nvPr/>
-        </p:nvPicPr>
-        <p:blipFill>
-          <a:blip r:embed="rId2"/>
-          <a:stretch>
-            <a:fillRect/>
-          </a:stretch>
-        </p:blipFill>
-        <p:spPr bwMode="auto">
-          <a:xfrm>
-            <a:off x="1181100" y="1193800"/>
-            <a:ext cx="6781800" cy="3390900"/>
-          </a:xfrm>
-          <a:prstGeom prst="rect">
-            <a:avLst/>
-          </a:prstGeom>
-          <a:noFill/>
-          <a:ln w="9525">
-            <a:noFill/>
-            <a:headEnd/>
-            <a:tailEnd/>
-          </a:ln>
-        </p:spPr>
-      </p:pic>
-    </p:spTree>
-  </p:cSld>
-</p:sld>
-</file>
-
-<file path=ppt/slides/slide13.xml><?xml version="1.0" encoding="utf-8"?>
-<p:sld xmlns:a="http://schemas.openxmlformats.org/drawingml/2006/main" xmlns:r="http://schemas.openxmlformats.org/officeDocument/2006/relationships" xmlns:p="http://schemas.openxmlformats.org/presentationml/2006/main">
-  <p:cSld>
-    <p:spTree>
-      <p:nvGrpSpPr>
-        <p:cNvPr id="1" name=""/>
-        <p:cNvGrpSpPr/>
-        <p:nvPr/>
-      </p:nvGrpSpPr>
-      <p:grpSpPr>
-        <a:xfrm>
-          <a:off x="0" y="0"/>
-          <a:ext cx="0" cy="0"/>
-          <a:chOff x="0" y="0"/>
-          <a:chExt cx="0" cy="0"/>
-        </a:xfrm>
-      </p:grpSpPr>
-      <p:pic>
-        <p:nvPicPr>
-          <p:cNvPr descr="MSB105-assign-2-presentasjon_files/figure-pptx/unnamed-chunk-5-4.png" id="0" name="Picture 1"/>
-          <p:cNvPicPr>
-            <a:picLocks noGrp="1" noChangeAspect="1"/>
-          </p:cNvPicPr>
-          <p:nvPr/>
-        </p:nvPicPr>
-        <p:blipFill>
-          <a:blip r:embed="rId2"/>
-          <a:stretch>
-            <a:fillRect/>
-          </a:stretch>
-        </p:blipFill>
-        <p:spPr bwMode="auto">
-          <a:xfrm>
-            <a:off x="1181100" y="1193800"/>
-            <a:ext cx="6781800" cy="3390900"/>
-          </a:xfrm>
-          <a:prstGeom prst="rect">
-            <a:avLst/>
-          </a:prstGeom>
-          <a:noFill/>
-          <a:ln w="9525">
-            <a:noFill/>
-            <a:headEnd/>
-            <a:tailEnd/>
-          </a:ln>
-        </p:spPr>
-      </p:pic>
-    </p:spTree>
-  </p:cSld>
-</p:sld>
-</file>
-
-<file path=ppt/slides/slide14.xml><?xml version="1.0" encoding="utf-8"?>
-<p:sld xmlns:a="http://schemas.openxmlformats.org/drawingml/2006/main" xmlns:r="http://schemas.openxmlformats.org/officeDocument/2006/relationships" xmlns:p="http://schemas.openxmlformats.org/presentationml/2006/main">
-  <p:cSld>
-    <p:spTree>
-      <p:nvGrpSpPr>
-        <p:cNvPr id="1" name=""/>
-        <p:cNvGrpSpPr/>
-        <p:nvPr/>
-      </p:nvGrpSpPr>
-      <p:grpSpPr>
-        <a:xfrm>
-          <a:off x="0" y="0"/>
-          <a:ext cx="0" cy="0"/>
-          <a:chOff x="0" y="0"/>
-          <a:chExt cx="0" cy="0"/>
-        </a:xfrm>
-      </p:grpSpPr>
-      <p:pic>
-        <p:nvPicPr>
-          <p:cNvPr descr="MSB105-assign-2-presentasjon_files/figure-pptx/unnamed-chunk-6-1.png" id="0" name="Picture 1"/>
-          <p:cNvPicPr>
-            <a:picLocks noGrp="1" noChangeAspect="1"/>
-          </p:cNvPicPr>
-          <p:nvPr/>
-        </p:nvPicPr>
-        <p:blipFill>
-          <a:blip r:embed="rId2"/>
-          <a:stretch>
-            <a:fillRect/>
-          </a:stretch>
-        </p:blipFill>
-        <p:spPr bwMode="auto">
-          <a:xfrm>
-            <a:off x="1181100" y="1193800"/>
-            <a:ext cx="6781800" cy="3390900"/>
-          </a:xfrm>
-          <a:prstGeom prst="rect">
-            <a:avLst/>
-          </a:prstGeom>
-          <a:noFill/>
-          <a:ln w="9525">
-            <a:noFill/>
-            <a:headEnd/>
-            <a:tailEnd/>
-          </a:ln>
-        </p:spPr>
-      </p:pic>
-    </p:spTree>
-  </p:cSld>
-</p:sld>
-</file>
-
-<file path=ppt/slides/slide15.xml><?xml version="1.0" encoding="utf-8"?>
-<p:sld xmlns:a="http://schemas.openxmlformats.org/drawingml/2006/main" xmlns:r="http://schemas.openxmlformats.org/officeDocument/2006/relationships" xmlns:p="http://schemas.openxmlformats.org/presentationml/2006/main">
-  <p:cSld>
-    <p:spTree>
-      <p:nvGrpSpPr>
-        <p:cNvPr id="1" name=""/>
-        <p:cNvGrpSpPr/>
-        <p:nvPr/>
-      </p:nvGrpSpPr>
-      <p:grpSpPr>
-        <a:xfrm>
-          <a:off x="0" y="0"/>
-          <a:ext cx="0" cy="0"/>
-          <a:chOff x="0" y="0"/>
-          <a:chExt cx="0" cy="0"/>
-        </a:xfrm>
-      </p:grpSpPr>
-      <p:pic>
-        <p:nvPicPr>
-          <p:cNvPr descr="MSB105-assign-2-presentasjon_files/figure-pptx/unnamed-chunk-6-2.png" id="0" name="Picture 1"/>
-          <p:cNvPicPr>
-            <a:picLocks noGrp="1" noChangeAspect="1"/>
-          </p:cNvPicPr>
-          <p:nvPr/>
-        </p:nvPicPr>
-        <p:blipFill>
-          <a:blip r:embed="rId2"/>
-          <a:stretch>
-            <a:fillRect/>
-          </a:stretch>
-        </p:blipFill>
-        <p:spPr bwMode="auto">
-          <a:xfrm>
-            <a:off x="1181100" y="1193800"/>
-            <a:ext cx="6781800" cy="3390900"/>
-          </a:xfrm>
-          <a:prstGeom prst="rect">
-            <a:avLst/>
-          </a:prstGeom>
-          <a:noFill/>
-          <a:ln w="9525">
-            <a:noFill/>
-            <a:headEnd/>
-            <a:tailEnd/>
-          </a:ln>
-        </p:spPr>
-      </p:pic>
-    </p:spTree>
-  </p:cSld>
-</p:sld>
-</file>
-
-<file path=ppt/slides/slide16.xml><?xml version="1.0" encoding="utf-8"?>
-<p:sld xmlns:a="http://schemas.openxmlformats.org/drawingml/2006/main" xmlns:r="http://schemas.openxmlformats.org/officeDocument/2006/relationships" xmlns:p="http://schemas.openxmlformats.org/presentationml/2006/main">
-  <p:cSld>
-    <p:spTree>
-      <p:nvGrpSpPr>
-        <p:cNvPr id="1" name=""/>
-        <p:cNvGrpSpPr/>
-        <p:nvPr/>
-      </p:nvGrpSpPr>
-      <p:grpSpPr>
-        <a:xfrm>
-          <a:off x="0" y="0"/>
-          <a:ext cx="0" cy="0"/>
-          <a:chOff x="0" y="0"/>
-          <a:chExt cx="0" cy="0"/>
-        </a:xfrm>
-      </p:grpSpPr>
-      <p:pic>
-        <p:nvPicPr>
-          <p:cNvPr descr="MSB105-assign-2-presentasjon_files/figure-pptx/unnamed-chunk-7-1.png" id="0" name="Picture 1"/>
-          <p:cNvPicPr>
-            <a:picLocks noGrp="1" noChangeAspect="1"/>
-          </p:cNvPicPr>
-          <p:nvPr/>
-        </p:nvPicPr>
-        <p:blipFill>
-          <a:blip r:embed="rId2"/>
-          <a:stretch>
-            <a:fillRect/>
-          </a:stretch>
-        </p:blipFill>
-        <p:spPr bwMode="auto">
-          <a:xfrm>
-            <a:off x="1181100" y="1193800"/>
-            <a:ext cx="6781800" cy="3390900"/>
-          </a:xfrm>
-          <a:prstGeom prst="rect">
-            <a:avLst/>
-          </a:prstGeom>
-          <a:noFill/>
-          <a:ln w="9525">
-            <a:noFill/>
-            <a:headEnd/>
-            <a:tailEnd/>
-          </a:ln>
-        </p:spPr>
-      </p:pic>
-    </p:spTree>
-  </p:cSld>
-</p:sld>
-</file>
-
-<file path=ppt/slides/slide17.xml><?xml version="1.0" encoding="utf-8"?>
-<p:sld xmlns:a="http://schemas.openxmlformats.org/drawingml/2006/main" xmlns:r="http://schemas.openxmlformats.org/officeDocument/2006/relationships" xmlns:p="http://schemas.openxmlformats.org/presentationml/2006/main">
-  <p:cSld>
-    <p:spTree>
-      <p:nvGrpSpPr>
-        <p:cNvPr id="1" name=""/>
-        <p:cNvGrpSpPr/>
-        <p:nvPr/>
-      </p:nvGrpSpPr>
-      <p:grpSpPr>
-        <a:xfrm>
-          <a:off x="0" y="0"/>
-          <a:ext cx="0" cy="0"/>
-          <a:chOff x="0" y="0"/>
-          <a:chExt cx="0" cy="0"/>
-        </a:xfrm>
-      </p:grpSpPr>
-      <p:graphicFrame>
-        <p:nvGraphicFramePr>
-          <p:cNvPr id="6" name="Content Placeholder 5"/>
-          <p:cNvGraphicFramePr>
-            <a:graphicFrameLocks noGrp="1"/>
-          </p:cNvGraphicFramePr>
-          <p:nvPr>
-            <p:ph idx="1"/>
-          </p:nvPr>
-        </p:nvGraphicFramePr>
-        <p:xfrm>
-          <a:off x="457200" y="1193800"/>
-          <a:ext cx="8229600" cy="3390900"/>
-        </p:xfrm>
-        <a:graphic>
-          <a:graphicData uri="http://schemas.openxmlformats.org/drawingml/2006/table">
-            <a:tbl>
-              <a:tblPr firstRow="1" bandRow="1">
-                <a:tableStyleId>{5C22544A-7EE6-4342-B048-85BDC9FD1C3A}</a:tableStyleId>
-              </a:tblPr>
-              <a:tblGrid>
-                <a:gridCol w="4114800"/>
-                <a:gridCol w="4114800"/>
-              </a:tblGrid>
-              <a:tr h="0">
-                <a:tc>
-                  <a:txBody>
-                    <a:bodyPr/>
-                    <a:lstStyle/>
-                    <a:p>
-                      <a:pPr lvl="0" indent="0" marL="0" algn="ctr">
-                        <a:buNone/>
-                      </a:pPr>
-                      <a:r>
-                        <a:rPr/>
-                        <a:t>Gj.snitt (menn)</a:t>
-                      </a:r>
-                    </a:p>
-                  </a:txBody>
-                  <a:tcPr/>
-                </a:tc>
-                <a:tc>
-                  <a:txBody>
-                    <a:bodyPr/>
-                    <a:lstStyle/>
-                    <a:p>
-                      <a:pPr lvl="0" indent="0" marL="0" algn="ctr">
-                        <a:buNone/>
-                      </a:pPr>
-                      <a:r>
-                        <a:rPr/>
-                        <a:t>Gj.snitt (kvinner)</a:t>
-                      </a:r>
-                    </a:p>
-                  </a:txBody>
-                  <a:tcPr/>
-                </a:tc>
-              </a:tr>
-              <a:tr h="0">
-                <a:tc>
-                  <a:txBody>
-                    <a:bodyPr/>
-                    <a:lstStyle/>
-                    <a:p>
-                      <a:pPr lvl="0" indent="0" marL="0" algn="ctr">
-                        <a:buNone/>
-                      </a:pPr>
-                      <a:r>
-                        <a:rPr/>
-                        <a:t>53510</a:t>
-                      </a:r>
-                    </a:p>
-                  </a:txBody>
-                </a:tc>
-                <a:tc>
-                  <a:txBody>
-                    <a:bodyPr/>
-                    <a:lstStyle/>
-                    <a:p>
-                      <a:pPr lvl="0" indent="0" marL="0" algn="ctr">
-                        <a:buNone/>
-                      </a:pPr>
-                      <a:r>
-                        <a:rPr/>
-                        <a:t>29588</a:t>
-                      </a:r>
-                    </a:p>
-                  </a:txBody>
-                </a:tc>
-              </a:tr>
-            </a:tbl>
-          </a:graphicData>
-        </a:graphic>
-      </p:graphicFrame>
-    </p:spTree>
-  </p:cSld>
-</p:sld>
-</file>
-
-<file path=ppt/slides/slide18.xml><?xml version="1.0" encoding="utf-8"?>
-<p:sld xmlns:a="http://schemas.openxmlformats.org/drawingml/2006/main" xmlns:r="http://schemas.openxmlformats.org/officeDocument/2006/relationships" xmlns:p="http://schemas.openxmlformats.org/presentationml/2006/main">
-  <p:cSld>
-    <p:spTree>
-      <p:nvGrpSpPr>
-        <p:cNvPr id="1" name=""/>
-        <p:cNvGrpSpPr/>
-        <p:nvPr/>
-      </p:nvGrpSpPr>
-      <p:grpSpPr>
-        <a:xfrm>
-          <a:off x="0" y="0"/>
-          <a:ext cx="0" cy="0"/>
-          <a:chOff x="0" y="0"/>
-          <a:chExt cx="0" cy="0"/>
-        </a:xfrm>
-      </p:grpSpPr>
-      <p:pic>
-        <p:nvPicPr>
-          <p:cNvPr descr="MSB105-assign-2-presentasjon_files/figure-pptx/unnamed-chunk-8-1.png" id="0" name="Picture 1"/>
-          <p:cNvPicPr>
-            <a:picLocks noGrp="1" noChangeAspect="1"/>
-          </p:cNvPicPr>
-          <p:nvPr/>
-        </p:nvPicPr>
-        <p:blipFill>
-          <a:blip r:embed="rId2"/>
-          <a:stretch>
-            <a:fillRect/>
-          </a:stretch>
-        </p:blipFill>
-        <p:spPr bwMode="auto">
-          <a:xfrm>
-            <a:off x="1181100" y="1193800"/>
-            <a:ext cx="6781800" cy="3390900"/>
-          </a:xfrm>
-          <a:prstGeom prst="rect">
-            <a:avLst/>
-          </a:prstGeom>
-          <a:noFill/>
-          <a:ln w="9525">
-            <a:noFill/>
-            <a:headEnd/>
-            <a:tailEnd/>
-          </a:ln>
-        </p:spPr>
-      </p:pic>
-    </p:spTree>
-  </p:cSld>
-</p:sld>
-</file>
-
-<file path=ppt/slides/slide19.xml><?xml version="1.0" encoding="utf-8"?>
-<p:sld xmlns:a="http://schemas.openxmlformats.org/drawingml/2006/main" xmlns:r="http://schemas.openxmlformats.org/officeDocument/2006/relationships" xmlns:p="http://schemas.openxmlformats.org/presentationml/2006/main">
-  <p:cSld>
-    <p:spTree>
-      <p:nvGrpSpPr>
-        <p:cNvPr id="1" name=""/>
-        <p:cNvGrpSpPr/>
-        <p:nvPr/>
-      </p:nvGrpSpPr>
-      <p:grpSpPr>
-        <a:xfrm>
-          <a:off x="0" y="0"/>
-          <a:ext cx="0" cy="0"/>
-          <a:chOff x="0" y="0"/>
-          <a:chExt cx="0" cy="0"/>
-        </a:xfrm>
-      </p:grpSpPr>
-      <p:sp>
-        <p:nvSpPr>
-          <p:cNvPr id="2" name="Title 1"/>
-          <p:cNvSpPr>
-            <a:spLocks noGrp="1"/>
-          </p:cNvSpPr>
-          <p:nvPr>
-            <p:ph type="title"/>
-          </p:nvPr>
-        </p:nvSpPr>
-        <p:spPr/>
-        <p:txBody>
-          <a:bodyPr/>
-          <a:lstStyle/>
-          <a:p>
-            <a:pPr lvl="0" indent="0" marL="0">
-              <a:buNone/>
-            </a:pPr>
-            <a:r>
-              <a:rPr/>
-              <a:t>7 Sammenhenger</a:t>
-            </a:r>
-          </a:p>
-        </p:txBody>
-      </p:sp>
-      <p:pic>
-        <p:nvPicPr>
-          <p:cNvPr descr="MSB105-assign-2-presentasjon_files/figure-pptx/unnamed-chunk-9-1.png" id="0" name="Picture 1"/>
-          <p:cNvPicPr>
-            <a:picLocks noGrp="1" noChangeAspect="1"/>
-          </p:cNvPicPr>
-          <p:nvPr/>
-        </p:nvPicPr>
-        <p:blipFill>
-          <a:blip r:embed="rId2"/>
-          <a:stretch>
-            <a:fillRect/>
-          </a:stretch>
-        </p:blipFill>
-        <p:spPr bwMode="auto">
-          <a:xfrm>
-            <a:off x="1181100" y="1193800"/>
-            <a:ext cx="6781800" cy="3390900"/>
-          </a:xfrm>
-          <a:prstGeom prst="rect">
-            <a:avLst/>
-          </a:prstGeom>
-          <a:noFill/>
-          <a:ln w="9525">
-            <a:noFill/>
-            <a:headEnd/>
-            <a:tailEnd/>
-          </a:ln>
-        </p:spPr>
-      </p:pic>
-    </p:spTree>
-  </p:cSld>
-</p:sld>
-</file>
-
-<file path=ppt/slides/slide2.xml><?xml version="1.0" encoding="utf-8"?>
-<p:sld xmlns:a="http://schemas.openxmlformats.org/drawingml/2006/main" xmlns:r="http://schemas.openxmlformats.org/officeDocument/2006/relationships" xmlns:p="http://schemas.openxmlformats.org/presentationml/2006/main">
-  <p:cSld>
-    <p:spTree>
-      <p:nvGrpSpPr>
-        <p:cNvPr id="1" name=""/>
-        <p:cNvGrpSpPr/>
-        <p:nvPr/>
-      </p:nvGrpSpPr>
-      <p:grpSpPr>
-        <a:xfrm>
-          <a:off x="0" y="0"/>
-          <a:ext cx="0" cy="0"/>
-          <a:chOff x="0" y="0"/>
-          <a:chExt cx="0" cy="0"/>
-        </a:xfrm>
-      </p:grpSpPr>
-      <p:sp>
-        <p:nvSpPr>
-          <p:cNvPr id="3" name="Content Placeholder 2"/>
-          <p:cNvSpPr>
-            <a:spLocks noGrp="1"/>
-          </p:cNvSpPr>
-          <p:nvPr>
-            <p:ph idx="1"/>
-          </p:nvPr>
-        </p:nvSpPr>
-        <p:spPr/>
-        <p:txBody>
-          <a:bodyPr/>
-          <a:lstStyle/>
-          <a:p>
-            <a:pPr lvl="0" indent="0" marL="0">
-              <a:buNone/>
-            </a:pPr>
-            <a:r>
-              <a:rPr/>
-              <a:t>(Lin, Lutter, and Ruhm, n.d.) (“Judge” n.d.)</a:t>
-            </a:r>
-          </a:p>
-        </p:txBody>
-      </p:sp>
-    </p:spTree>
-  </p:cSld>
-</p:sld>
-</file>
-
-<file path=ppt/slides/slide20.xml><?xml version="1.0" encoding="utf-8"?>
 <p:sld xmlns:a="http://schemas.openxmlformats.org/drawingml/2006/main" xmlns:r="http://schemas.openxmlformats.org/officeDocument/2006/relationships" xmlns:p="http://schemas.openxmlformats.org/presentationml/2006/main">
   <p:cSld>
     <p:spTree>
@@ -3995,7 +3435,7 @@
 </p:sld>
 </file>
 
-<file path=ppt/slides/slide21.xml><?xml version="1.0" encoding="utf-8"?>
+<file path=ppt/slides/slide13.xml><?xml version="1.0" encoding="utf-8"?>
 <p:sld xmlns:a="http://schemas.openxmlformats.org/drawingml/2006/main" xmlns:r="http://schemas.openxmlformats.org/officeDocument/2006/relationships" xmlns:p="http://schemas.openxmlformats.org/presentationml/2006/main">
   <p:cSld>
     <p:spTree>
@@ -4014,7 +3454,7 @@
       </p:grpSpPr>
       <p:pic>
         <p:nvPicPr>
-          <p:cNvPr descr="MSB105-assign-2-presentasjon_files/figure-pptx/unnamed-chunk-10-1.png" id="0" name="Picture 1"/>
+          <p:cNvPr descr="MSB105-assign-2-presentasjon_files/figure-pptx/unnamed-chunk-6-1.png" id="0" name="Picture 1"/>
           <p:cNvPicPr>
             <a:picLocks noGrp="1" noChangeAspect="1"/>
           </p:cNvPicPr>
@@ -4047,7 +3487,7 @@
 </p:sld>
 </file>
 
-<file path=ppt/slides/slide22.xml><?xml version="1.0" encoding="utf-8"?>
+<file path=ppt/slides/slide14.xml><?xml version="1.0" encoding="utf-8"?>
 <p:sld xmlns:a="http://schemas.openxmlformats.org/drawingml/2006/main" xmlns:r="http://schemas.openxmlformats.org/officeDocument/2006/relationships" xmlns:p="http://schemas.openxmlformats.org/presentationml/2006/main">
   <p:cSld>
     <p:spTree>
@@ -4537,7 +3977,7 @@
 </p:sld>
 </file>
 
-<file path=ppt/slides/slide23.xml><?xml version="1.0" encoding="utf-8"?>
+<file path=ppt/slides/slide15.xml><?xml version="1.0" encoding="utf-8"?>
 <p:sld xmlns:a="http://schemas.openxmlformats.org/drawingml/2006/main" xmlns:r="http://schemas.openxmlformats.org/officeDocument/2006/relationships" xmlns:p="http://schemas.openxmlformats.org/presentationml/2006/main">
   <p:cSld>
     <p:spTree>
@@ -4640,7 +4080,7 @@
 </p:sld>
 </file>
 
-<file path=ppt/slides/slide24.xml><?xml version="1.0" encoding="utf-8"?>
+<file path=ppt/slides/slide16.xml><?xml version="1.0" encoding="utf-8"?>
 <p:sld xmlns:a="http://schemas.openxmlformats.org/drawingml/2006/main" xmlns:r="http://schemas.openxmlformats.org/officeDocument/2006/relationships" xmlns:p="http://schemas.openxmlformats.org/presentationml/2006/main">
   <p:cSld>
     <p:spTree>
@@ -4748,6 +4188,53 @@
             <a:r>
               <a:rPr/>
               <a:t>“Women Benefit the Most from Taking Higher Education.” n.d. https://kifinfo.no/en/2025/04/women-benefit-most-taking-higher-education. Accessed October 16, 2025.</a:t>
+            </a:r>
+          </a:p>
+        </p:txBody>
+      </p:sp>
+    </p:spTree>
+  </p:cSld>
+</p:sld>
+</file>
+
+<file path=ppt/slides/slide2.xml><?xml version="1.0" encoding="utf-8"?>
+<p:sld xmlns:a="http://schemas.openxmlformats.org/drawingml/2006/main" xmlns:r="http://schemas.openxmlformats.org/officeDocument/2006/relationships" xmlns:p="http://schemas.openxmlformats.org/presentationml/2006/main">
+  <p:cSld>
+    <p:spTree>
+      <p:nvGrpSpPr>
+        <p:cNvPr id="1" name=""/>
+        <p:cNvGrpSpPr/>
+        <p:nvPr/>
+      </p:nvGrpSpPr>
+      <p:grpSpPr>
+        <a:xfrm>
+          <a:off x="0" y="0"/>
+          <a:ext cx="0" cy="0"/>
+          <a:chOff x="0" y="0"/>
+          <a:chExt cx="0" cy="0"/>
+        </a:xfrm>
+      </p:grpSpPr>
+      <p:sp>
+        <p:nvSpPr>
+          <p:cNvPr id="3" name="Content Placeholder 2"/>
+          <p:cNvSpPr>
+            <a:spLocks noGrp="1"/>
+          </p:cNvSpPr>
+          <p:nvPr>
+            <p:ph idx="1"/>
+          </p:nvPr>
+        </p:nvSpPr>
+        <p:spPr/>
+        <p:txBody>
+          <a:bodyPr/>
+          <a:lstStyle/>
+          <a:p>
+            <a:pPr lvl="0" indent="0" marL="0">
+              <a:buNone/>
+            </a:pPr>
+            <a:r>
+              <a:rPr/>
+              <a:t>(Lin, Lutter, and Ruhm, n.d.) (“Judge” n.d.)</a:t>
             </a:r>
           </a:p>
         </p:txBody>
@@ -5032,46 +4519,6 @@
           </a:p>
         </p:txBody>
       </p:sp>
-      <p:sp>
-        <p:nvSpPr>
-          <p:cNvPr id="3" name="Content Placeholder 2"/>
-          <p:cNvSpPr>
-            <a:spLocks noGrp="1"/>
-          </p:cNvSpPr>
-          <p:nvPr>
-            <p:ph idx="1"/>
-          </p:nvPr>
-        </p:nvSpPr>
-        <p:spPr/>
-        <p:txBody>
-          <a:bodyPr/>
-          <a:lstStyle/>
-          <a:p>
-            <a:pPr lvl="0" indent="0">
-              <a:buNone/>
-            </a:pPr>
-            <a:r>
-              <a:rPr>
-                <a:latin typeface="Courier"/>
-              </a:rPr>
-              <a:t># A tibble: 7,006 × 8
-   income height weight   age marital  sex    education  afqt
-    &lt;int&gt;  &lt;dbl&gt;  &lt;int&gt; &lt;int&gt; &lt;fct&gt;    &lt;fct&gt;      &lt;int&gt; &lt;dbl&gt;
- 1  19000     60    155    53 married  female        13  6.84
- 2  35000     70    156    51 married  female        10 49.4 
- 3 105000     65    195    52 married  male          16 99.4 
- 4  40000     63    197    54 married  female        14 44.0 
- 5  75000     66    190    49 married  male          14 59.7 
- 6 102000     68    200    49 divorced female        18 98.8 
- 7      0     74    225    48 married  male          16 82.3 
- 8  70000     64    160    54 divorced female        12 50.3 
- 9  60000     69    162    55 divorced male          12 89.7 
-10 150000     69    194    54 divorced male          13 96.0 
-# ℹ 6,996 more rows</a:t>
-            </a:r>
-          </a:p>
-        </p:txBody>
-      </p:sp>
     </p:spTree>
   </p:cSld>
 </p:sld>
@@ -5119,28 +4566,6 @@
           </a:p>
         </p:txBody>
       </p:sp>
-    </p:spTree>
-  </p:cSld>
-</p:sld>
-</file>
-
-<file path=ppt/slides/slide7.xml><?xml version="1.0" encoding="utf-8"?>
-<p:sld xmlns:a="http://schemas.openxmlformats.org/drawingml/2006/main" xmlns:r="http://schemas.openxmlformats.org/officeDocument/2006/relationships" xmlns:p="http://schemas.openxmlformats.org/presentationml/2006/main">
-  <p:cSld>
-    <p:spTree>
-      <p:nvGrpSpPr>
-        <p:cNvPr id="1" name=""/>
-        <p:cNvGrpSpPr/>
-        <p:nvPr/>
-      </p:nvGrpSpPr>
-      <p:grpSpPr>
-        <a:xfrm>
-          <a:off x="0" y="0"/>
-          <a:ext cx="0" cy="0"/>
-          <a:chOff x="0" y="0"/>
-          <a:chExt cx="0" cy="0"/>
-        </a:xfrm>
-      </p:grpSpPr>
       <p:graphicFrame>
         <p:nvGraphicFramePr>
           <p:cNvPr id="6" name="Content Placeholder 5"/>
@@ -5162,15 +4587,17 @@
                 <a:tableStyleId>{5C22544A-7EE6-4342-B048-85BDC9FD1C3A}</a:tableStyleId>
               </a:tblPr>
               <a:tblGrid>
-                <a:gridCol w="469900"/>
-                <a:gridCol w="1041400"/>
-                <a:gridCol w="1104900"/>
-                <a:gridCol w="927100"/>
-                <a:gridCol w="863600"/>
-                <a:gridCol w="927100"/>
-                <a:gridCol w="749300"/>
-                <a:gridCol w="990600"/>
-                <a:gridCol w="1155700"/>
+                <a:gridCol w="342900"/>
+                <a:gridCol w="787400"/>
+                <a:gridCol w="825500"/>
+                <a:gridCol w="698500"/>
+                <a:gridCol w="647700"/>
+                <a:gridCol w="698500"/>
+                <a:gridCol w="571500"/>
+                <a:gridCol w="736600"/>
+                <a:gridCol w="876300"/>
+                <a:gridCol w="1092200"/>
+                <a:gridCol w="952500"/>
               </a:tblGrid>
               <a:tr h="0">
                 <a:tc>
@@ -5317,6 +4744,38 @@
                   </a:txBody>
                   <a:tcPr/>
                 </a:tc>
+                <a:tc>
+                  <a:txBody>
+                    <a:bodyPr/>
+                    <a:lstStyle/>
+                    <a:p>
+                      <a:pPr lvl="0" indent="0" marL="0" algn="ctr">
+                        <a:buNone/>
+                      </a:pPr>
+                      <a:r>
+                        <a:rPr/>
+                        <a:t>Gj.snitt AFQT (kvinner)</a:t>
+                      </a:r>
+                    </a:p>
+                  </a:txBody>
+                  <a:tcPr/>
+                </a:tc>
+                <a:tc>
+                  <a:txBody>
+                    <a:bodyPr/>
+                    <a:lstStyle/>
+                    <a:p>
+                      <a:pPr lvl="0" indent="0" marL="0" algn="ctr">
+                        <a:buNone/>
+                      </a:pPr>
+                      <a:r>
+                        <a:rPr/>
+                        <a:t>Gj.snitt AFQT (menn)</a:t>
+                      </a:r>
+                    </a:p>
+                  </a:txBody>
+                  <a:tcPr/>
+                </a:tc>
               </a:tr>
               <a:tr h="0">
                 <a:tc>
@@ -5454,6 +4913,36 @@
                     </a:p>
                   </a:txBody>
                 </a:tc>
+                <a:tc>
+                  <a:txBody>
+                    <a:bodyPr/>
+                    <a:lstStyle/>
+                    <a:p>
+                      <a:pPr lvl="0" indent="0" marL="0" algn="ctr">
+                        <a:buNone/>
+                      </a:pPr>
+                      <a:r>
+                        <a:rPr/>
+                        <a:t>40.6</a:t>
+                      </a:r>
+                    </a:p>
+                  </a:txBody>
+                </a:tc>
+                <a:tc>
+                  <a:txBody>
+                    <a:bodyPr/>
+                    <a:lstStyle/>
+                    <a:p>
+                      <a:pPr lvl="0" indent="0" marL="0" algn="ctr">
+                        <a:buNone/>
+                      </a:pPr>
+                      <a:r>
+                        <a:rPr/>
+                        <a:t>41.9</a:t>
+                      </a:r>
+                    </a:p>
+                  </a:txBody>
+                </a:tc>
               </a:tr>
             </a:tbl>
           </a:graphicData>
@@ -5484,11 +4973,88 @@
             </a:pPr>
             <a:r>
               <a:rPr/>
-              <a:t>Beskrivende statistikk</a:t>
-            </a:r>
-          </a:p>
-        </p:txBody>
-      </p:sp>
+              <a:t>Sammendrag av utvalgets nøkkelstatistikk</a:t>
+            </a:r>
+          </a:p>
+        </p:txBody>
+      </p:sp>
+    </p:spTree>
+  </p:cSld>
+</p:sld>
+</file>
+
+<file path=ppt/slides/slide7.xml><?xml version="1.0" encoding="utf-8"?>
+<p:sld xmlns:a="http://schemas.openxmlformats.org/drawingml/2006/main" xmlns:r="http://schemas.openxmlformats.org/officeDocument/2006/relationships" xmlns:p="http://schemas.openxmlformats.org/presentationml/2006/main">
+  <p:cSld>
+    <p:spTree>
+      <p:nvGrpSpPr>
+        <p:cNvPr id="1" name=""/>
+        <p:cNvGrpSpPr/>
+        <p:nvPr/>
+      </p:nvGrpSpPr>
+      <p:grpSpPr>
+        <a:xfrm>
+          <a:off x="0" y="0"/>
+          <a:ext cx="0" cy="0"/>
+          <a:chOff x="0" y="0"/>
+          <a:chExt cx="0" cy="0"/>
+        </a:xfrm>
+      </p:grpSpPr>
+      <p:sp>
+        <p:nvSpPr>
+          <p:cNvPr id="2" name="Title 1"/>
+          <p:cNvSpPr>
+            <a:spLocks noGrp="1"/>
+          </p:cNvSpPr>
+          <p:nvPr>
+            <p:ph type="title"/>
+          </p:nvPr>
+        </p:nvSpPr>
+        <p:spPr/>
+        <p:txBody>
+          <a:bodyPr/>
+          <a:lstStyle/>
+          <a:p>
+            <a:pPr lvl="0" indent="0" marL="0">
+              <a:buNone/>
+            </a:pPr>
+            <a:r>
+              <a:rPr/>
+              <a:t>5 Fordeling av variabler</a:t>
+            </a:r>
+          </a:p>
+        </p:txBody>
+      </p:sp>
+      <p:pic>
+        <p:nvPicPr>
+          <p:cNvPr descr="MSB105-assign-2-presentasjon_files/figure-pptx/unnamed-chunk-3-1.png" id="0" name="Picture 1"/>
+          <p:cNvPicPr>
+            <a:picLocks noGrp="1" noChangeAspect="1"/>
+          </p:cNvPicPr>
+          <p:nvPr/>
+        </p:nvPicPr>
+        <p:blipFill>
+          <a:blip r:embed="rId2"/>
+          <a:stretch>
+            <a:fillRect/>
+          </a:stretch>
+        </p:blipFill>
+        <p:spPr bwMode="auto">
+          <a:xfrm>
+            <a:off x="1181100" y="1193800"/>
+            <a:ext cx="6781800" cy="3390900"/>
+          </a:xfrm>
+          <a:prstGeom prst="rect">
+            <a:avLst/>
+          </a:prstGeom>
+          <a:noFill/>
+          <a:ln w="9525">
+            <a:noFill/>
+            <a:headEnd/>
+            <a:tailEnd/>
+          </a:ln>
+        </p:spPr>
+      </p:pic>
     </p:spTree>
   </p:cSld>
 </p:sld>
@@ -5511,31 +5077,6 @@
           <a:chExt cx="0" cy="0"/>
         </a:xfrm>
       </p:grpSpPr>
-      <p:sp>
-        <p:nvSpPr>
-          <p:cNvPr id="2" name="Title 1"/>
-          <p:cNvSpPr>
-            <a:spLocks noGrp="1"/>
-          </p:cNvSpPr>
-          <p:nvPr>
-            <p:ph type="title"/>
-          </p:nvPr>
-        </p:nvSpPr>
-        <p:spPr/>
-        <p:txBody>
-          <a:bodyPr/>
-          <a:lstStyle/>
-          <a:p>
-            <a:pPr lvl="0" indent="0" marL="0">
-              <a:buNone/>
-            </a:pPr>
-            <a:r>
-              <a:rPr/>
-              <a:t>5 Fordeling av variabler</a:t>
-            </a:r>
-          </a:p>
-        </p:txBody>
-      </p:sp>
       <p:pic>
         <p:nvPicPr>
           <p:cNvPr descr="MSB105-assign-2-presentasjon_files/figure-pptx/unnamed-chunk-4-1.png" id="0" name="Picture 1"/>
@@ -5588,9 +5129,34 @@
           <a:chExt cx="0" cy="0"/>
         </a:xfrm>
       </p:grpSpPr>
+      <p:sp>
+        <p:nvSpPr>
+          <p:cNvPr id="2" name="Title 1"/>
+          <p:cNvSpPr>
+            <a:spLocks noGrp="1"/>
+          </p:cNvSpPr>
+          <p:nvPr>
+            <p:ph type="title"/>
+          </p:nvPr>
+        </p:nvSpPr>
+        <p:spPr/>
+        <p:txBody>
+          <a:bodyPr/>
+          <a:lstStyle/>
+          <a:p>
+            <a:pPr lvl="0" indent="0" marL="0">
+              <a:buNone/>
+            </a:pPr>
+            <a:r>
+              <a:rPr/>
+              <a:t>6 Kjønnsforskjeller</a:t>
+            </a:r>
+          </a:p>
+        </p:txBody>
+      </p:sp>
       <p:pic>
         <p:nvPicPr>
-          <p:cNvPr descr="MSB105-assign-2-presentasjon_files/figure-pptx/unnamed-chunk-4-2.png" id="0" name="Picture 1"/>
+          <p:cNvPr descr="MSB105-assign-2-presentasjon_files/figure-pptx/Fordeling%20av%20kjonn%20og%20inntekt-1.png" id="0" name="Picture 1"/>
           <p:cNvPicPr>
             <a:picLocks noGrp="1" noChangeAspect="1"/>
           </p:cNvPicPr>

</xml_diff>

<commit_message>
Så og si ferdig med alle tabeller
</commit_message>
<xml_diff>
--- a/MSB105 assign 2 presentasjon.pptx
+++ b/MSB105 assign 2 presentasjon.pptx
@@ -3235,7 +3235,7 @@
             </a:pPr>
             <a:r>
               <a:rPr/>
-              <a:t>8 Kjønnsforskjeller</a:t>
+              <a:t>9 Kjønnsforskjeller</a:t>
             </a:r>
           </a:p>
         </p:txBody>
@@ -3292,6 +3292,31 @@
           <a:chExt cx="0" cy="0"/>
         </a:xfrm>
       </p:grpSpPr>
+      <p:sp>
+        <p:nvSpPr>
+          <p:cNvPr id="2" name="Title 1"/>
+          <p:cNvSpPr>
+            <a:spLocks noGrp="1"/>
+          </p:cNvSpPr>
+          <p:nvPr>
+            <p:ph type="title"/>
+          </p:nvPr>
+        </p:nvSpPr>
+        <p:spPr/>
+        <p:txBody>
+          <a:bodyPr/>
+          <a:lstStyle/>
+          <a:p>
+            <a:pPr lvl="0" indent="0" marL="0">
+              <a:buNone/>
+            </a:pPr>
+            <a:r>
+              <a:rPr/>
+              <a:t>10 </a:t>
+            </a:r>
+          </a:p>
+        </p:txBody>
+      </p:sp>
       <p:pic>
         <p:nvPicPr>
           <p:cNvPr descr="MSB105-assign-2-presentasjon_files/figure-pptx/Fordeling%20av%20AFQT-1.png" id="0" name="Picture 1"/>
@@ -3364,7 +3389,7 @@
             </a:pPr>
             <a:r>
               <a:rPr/>
-              <a:t>9 Sammenhenger</a:t>
+              <a:t>11 Sammenhenger</a:t>
             </a:r>
           </a:p>
         </p:txBody>
@@ -3441,7 +3466,7 @@
             </a:pPr>
             <a:r>
               <a:rPr/>
-              <a:t>10 Korrelasjoner eller regresjonsmedell</a:t>
+              <a:t>12 Korrelasjoner eller regresjonsmedell</a:t>
             </a:r>
           </a:p>
         </p:txBody>
@@ -3532,7 +3557,7 @@
       </p:grpSpPr>
       <p:pic>
         <p:nvPicPr>
-          <p:cNvPr descr="MSB105-assign-2-presentasjon_files/figure-pptx/unnamed-chunk-7-1.png" id="0" name="Picture 1"/>
+          <p:cNvPr descr="MSB105-assign-2-presentasjon_files/figure-pptx/unnamed-chunk-6-1.png" id="0" name="Picture 1"/>
           <p:cNvPicPr>
             <a:picLocks noGrp="1" noChangeAspect="1"/>
           </p:cNvPicPr>
@@ -4092,7 +4117,7 @@
             </a:pPr>
             <a:r>
               <a:rPr/>
-              <a:t>11 diskusjon</a:t>
+              <a:t>13 diskusjon</a:t>
             </a:r>
           </a:p>
         </p:txBody>
@@ -4148,7 +4173,7 @@
             </a:pPr>
             <a:r>
               <a:rPr b="1"/>
-              <a:t>12 Stemmer funn med litteraturen? Mulige mekanismer? Begrensninger?</a:t>
+              <a:t>14 Stemmer funn med litteraturen? Mulige mekanismer? Begrensninger?</a:t>
             </a:r>
           </a:p>
         </p:txBody>
@@ -4195,7 +4220,7 @@
             </a:pPr>
             <a:r>
               <a:rPr/>
-              <a:t>13 konklusjon</a:t>
+              <a:t>15 konklusjon</a:t>
             </a:r>
           </a:p>
         </p:txBody>
@@ -4230,7 +4255,7 @@
             </a:pPr>
             <a:r>
               <a:rPr b="1"/>
-              <a:t>14 Impliserte videre steg (flere kontrollvariabler, robusthetstester, modellvalg)</a:t>
+              <a:t>16 Impliserte videre steg (flere kontrollvariabler, robusthetstester, modellvalg)</a:t>
             </a:r>
           </a:p>
           <a:p>
@@ -5052,6 +5077,29 @@
             <a:r>
               <a:rPr/>
               <a:t>5 Data grunnlag &amp; klargjøring</a:t>
+            </a:r>
+          </a:p>
+        </p:txBody>
+      </p:sp>
+      <p:sp>
+        <p:nvSpPr>
+          <p:cNvPr id="3" name="Content Placeholder 2"/>
+          <p:cNvSpPr>
+            <a:spLocks noGrp="1"/>
+          </p:cNvSpPr>
+          <p:nvPr>
+            <p:ph idx="1"/>
+          </p:nvPr>
+        </p:nvSpPr>
+        <p:spPr/>
+        <p:txBody>
+          <a:bodyPr/>
+          <a:lstStyle/>
+          <a:p>
+            <a:pPr lvl="0"/>
+            <a:r>
+              <a:rPr/>
+              <a:t>Henter data ut fra modellen heights, som er datasett fra rstudio sin pakke modelr</a:t>
             </a:r>
           </a:p>
         </p:txBody>
@@ -5614,6 +5662,31 @@
           <a:chExt cx="0" cy="0"/>
         </a:xfrm>
       </p:grpSpPr>
+      <p:sp>
+        <p:nvSpPr>
+          <p:cNvPr id="2" name="Title 1"/>
+          <p:cNvSpPr>
+            <a:spLocks noGrp="1"/>
+          </p:cNvSpPr>
+          <p:nvPr>
+            <p:ph type="title"/>
+          </p:nvPr>
+        </p:nvSpPr>
+        <p:spPr/>
+        <p:txBody>
+          <a:bodyPr/>
+          <a:lstStyle/>
+          <a:p>
+            <a:pPr lvl="0" indent="0" marL="0">
+              <a:buNone/>
+            </a:pPr>
+            <a:r>
+              <a:rPr/>
+              <a:t>8 </a:t>
+            </a:r>
+          </a:p>
+        </p:txBody>
+      </p:sp>
       <p:pic>
         <p:nvPicPr>
           <p:cNvPr descr="MSB105-assign-2-presentasjon_files/figure-pptx/unnamed-chunk-4-1.png" id="0" name="Picture 1"/>

</xml_diff>